<commit_message>
Commiting old changes from before ICCE 2010 conference.
</commit_message>
<xml_diff>
--- a/documents/patent_images_after_discussion_2Feb2010.pptx
+++ b/documents/patent_images_after_discussion_2Feb2010.pptx
@@ -231,7 +231,7 @@
             <a:fld id="{5FDA562B-22A4-4EC6-A29C-A9536D0BEC1F}" type="datetimeFigureOut">
               <a:rPr lang="en-US" smtClean="0"/>
               <a:pPr/>
-              <a:t>5/19/2010</a:t>
+              <a:t>8/9/2010</a:t>
             </a:fld>
             <a:endParaRPr lang="en-US"/>
           </a:p>
@@ -1426,7 +1426,7 @@
               <a:pPr>
                 <a:defRPr/>
               </a:pPr>
-              <a:t>2010/5/19</a:t>
+              <a:t>2010/8/9</a:t>
             </a:fld>
             <a:endParaRPr lang="ja-JP" altLang="en-US"/>
           </a:p>
@@ -1650,7 +1650,7 @@
               <a:pPr>
                 <a:defRPr/>
               </a:pPr>
-              <a:t>2010/5/19</a:t>
+              <a:t>2010/8/9</a:t>
             </a:fld>
             <a:endParaRPr lang="ja-JP" altLang="en-US"/>
           </a:p>
@@ -1884,7 +1884,7 @@
               <a:pPr>
                 <a:defRPr/>
               </a:pPr>
-              <a:t>2010/5/19</a:t>
+              <a:t>2010/8/9</a:t>
             </a:fld>
             <a:endParaRPr lang="ja-JP" altLang="en-US"/>
           </a:p>
@@ -2108,7 +2108,7 @@
               <a:pPr>
                 <a:defRPr/>
               </a:pPr>
-              <a:t>2010/5/19</a:t>
+              <a:t>2010/8/9</a:t>
             </a:fld>
             <a:endParaRPr lang="ja-JP" altLang="en-US"/>
           </a:p>
@@ -2376,7 +2376,7 @@
               <a:pPr>
                 <a:defRPr/>
               </a:pPr>
-              <a:t>2010/5/19</a:t>
+              <a:t>2010/8/9</a:t>
             </a:fld>
             <a:endParaRPr lang="ja-JP" altLang="en-US"/>
           </a:p>
@@ -2750,7 +2750,7 @@
               <a:pPr>
                 <a:defRPr/>
               </a:pPr>
-              <a:t>2010/5/19</a:t>
+              <a:t>2010/8/9</a:t>
             </a:fld>
             <a:endParaRPr lang="ja-JP" altLang="en-US"/>
           </a:p>
@@ -3258,7 +3258,7 @@
               <a:pPr>
                 <a:defRPr/>
               </a:pPr>
-              <a:t>2010/5/19</a:t>
+              <a:t>2010/8/9</a:t>
             </a:fld>
             <a:endParaRPr lang="ja-JP" altLang="en-US"/>
           </a:p>
@@ -3398,7 +3398,7 @@
               <a:pPr>
                 <a:defRPr/>
               </a:pPr>
-              <a:t>2010/5/19</a:t>
+              <a:t>2010/8/9</a:t>
             </a:fld>
             <a:endParaRPr lang="ja-JP" altLang="en-US"/>
           </a:p>
@@ -3515,7 +3515,7 @@
               <a:pPr>
                 <a:defRPr/>
               </a:pPr>
-              <a:t>2010/5/19</a:t>
+              <a:t>2010/8/9</a:t>
             </a:fld>
             <a:endParaRPr lang="ja-JP" altLang="en-US"/>
           </a:p>
@@ -3846,7 +3846,7 @@
               <a:pPr>
                 <a:defRPr/>
               </a:pPr>
-              <a:t>2010/5/19</a:t>
+              <a:t>2010/8/9</a:t>
             </a:fld>
             <a:endParaRPr lang="ja-JP" altLang="en-US"/>
           </a:p>
@@ -4124,7 +4124,7 @@
               <a:pPr>
                 <a:defRPr/>
               </a:pPr>
-              <a:t>2010/5/19</a:t>
+              <a:t>2010/8/9</a:t>
             </a:fld>
             <a:endParaRPr lang="ja-JP" altLang="en-US"/>
           </a:p>
@@ -4412,7 +4412,7 @@
               <a:pPr>
                 <a:defRPr/>
               </a:pPr>
-              <a:t>2010/5/19</a:t>
+              <a:t>2010/8/9</a:t>
             </a:fld>
             <a:endParaRPr lang="ja-JP" altLang="en-US"/>
           </a:p>
@@ -11891,15 +11891,23 @@
                             <a:schemeClr val="tx1"/>
                           </a:solidFill>
                         </a:rPr>
-                        <a:t>Duration [</a:t>
+                        <a:t>Duration </a:t>
                       </a:r>
+                      <a:endParaRPr lang="en-US" sz="1100" dirty="0" smtClean="0">
+                        <a:solidFill>
+                          <a:schemeClr val="tx1"/>
+                        </a:solidFill>
+                      </a:endParaRPr>
+                    </a:p>
+                    <a:p>
+                      <a:pPr algn="ctr"/>
                       <a:r>
-                        <a:rPr lang="en-US" sz="1100" dirty="0" err="1" smtClean="0">
+                        <a:rPr lang="en-US" sz="1100" dirty="0" smtClean="0">
                           <a:solidFill>
                             <a:schemeClr val="tx1"/>
                           </a:solidFill>
                         </a:rPr>
-                        <a:t>start_time</a:t>
+                        <a:t>[start-time</a:t>
                       </a:r>
                       <a:r>
                         <a:rPr lang="en-US" sz="1100" dirty="0" smtClean="0">
@@ -11918,12 +11926,12 @@
                         <a:t> </a:t>
                       </a:r>
                       <a:r>
-                        <a:rPr lang="en-US" sz="1100" baseline="0" dirty="0" err="1" smtClean="0">
+                        <a:rPr lang="en-US" sz="1100" baseline="0" dirty="0" smtClean="0">
                           <a:solidFill>
                             <a:schemeClr val="tx1"/>
                           </a:solidFill>
                         </a:rPr>
-                        <a:t>end_time</a:t>
+                        <a:t>end-time</a:t>
                       </a:r>
                       <a:r>
                         <a:rPr lang="en-US" sz="1100" baseline="0" dirty="0" smtClean="0">

</xml_diff>